<commit_message>
updated doc on 9 jun 2023 for interns
</commit_message>
<xml_diff>
--- a/Docs/Software-tools-overview-for-chat-app.pptx
+++ b/Docs/Software-tools-overview-for-chat-app.pptx
@@ -14,6 +14,7 @@
     <p:sldId id="262" r:id="rId8"/>
     <p:sldId id="263" r:id="rId9"/>
     <p:sldId id="264" r:id="rId10"/>
+    <p:sldId id="265" r:id="rId11"/>
   </p:sldIdLst>
   <p:sldSz cx="12192000" cy="6858000"/>
   <p:notesSz cx="6858000" cy="9144000"/>
@@ -269,7 +270,7 @@
           <a:p>
             <a:fld id="{46B19C4C-2588-E949-9236-D180C138B8F2}" type="datetimeFigureOut">
               <a:rPr lang="en-US" smtClean="0"/>
-              <a:t>6/6/23</a:t>
+              <a:t>6/9/23</a:t>
             </a:fld>
             <a:endParaRPr lang="en-US"/>
           </a:p>
@@ -469,7 +470,7 @@
           <a:p>
             <a:fld id="{46B19C4C-2588-E949-9236-D180C138B8F2}" type="datetimeFigureOut">
               <a:rPr lang="en-US" smtClean="0"/>
-              <a:t>6/6/23</a:t>
+              <a:t>6/9/23</a:t>
             </a:fld>
             <a:endParaRPr lang="en-US"/>
           </a:p>
@@ -679,7 +680,7 @@
           <a:p>
             <a:fld id="{46B19C4C-2588-E949-9236-D180C138B8F2}" type="datetimeFigureOut">
               <a:rPr lang="en-US" smtClean="0"/>
-              <a:t>6/6/23</a:t>
+              <a:t>6/9/23</a:t>
             </a:fld>
             <a:endParaRPr lang="en-US"/>
           </a:p>
@@ -879,7 +880,7 @@
           <a:p>
             <a:fld id="{46B19C4C-2588-E949-9236-D180C138B8F2}" type="datetimeFigureOut">
               <a:rPr lang="en-US" smtClean="0"/>
-              <a:t>6/6/23</a:t>
+              <a:t>6/9/23</a:t>
             </a:fld>
             <a:endParaRPr lang="en-US"/>
           </a:p>
@@ -1155,7 +1156,7 @@
           <a:p>
             <a:fld id="{46B19C4C-2588-E949-9236-D180C138B8F2}" type="datetimeFigureOut">
               <a:rPr lang="en-US" smtClean="0"/>
-              <a:t>6/6/23</a:t>
+              <a:t>6/9/23</a:t>
             </a:fld>
             <a:endParaRPr lang="en-US"/>
           </a:p>
@@ -1423,7 +1424,7 @@
           <a:p>
             <a:fld id="{46B19C4C-2588-E949-9236-D180C138B8F2}" type="datetimeFigureOut">
               <a:rPr lang="en-US" smtClean="0"/>
-              <a:t>6/6/23</a:t>
+              <a:t>6/9/23</a:t>
             </a:fld>
             <a:endParaRPr lang="en-US"/>
           </a:p>
@@ -1838,7 +1839,7 @@
           <a:p>
             <a:fld id="{46B19C4C-2588-E949-9236-D180C138B8F2}" type="datetimeFigureOut">
               <a:rPr lang="en-US" smtClean="0"/>
-              <a:t>6/6/23</a:t>
+              <a:t>6/9/23</a:t>
             </a:fld>
             <a:endParaRPr lang="en-US"/>
           </a:p>
@@ -1980,7 +1981,7 @@
           <a:p>
             <a:fld id="{46B19C4C-2588-E949-9236-D180C138B8F2}" type="datetimeFigureOut">
               <a:rPr lang="en-US" smtClean="0"/>
-              <a:t>6/6/23</a:t>
+              <a:t>6/9/23</a:t>
             </a:fld>
             <a:endParaRPr lang="en-US"/>
           </a:p>
@@ -2093,7 +2094,7 @@
           <a:p>
             <a:fld id="{46B19C4C-2588-E949-9236-D180C138B8F2}" type="datetimeFigureOut">
               <a:rPr lang="en-US" smtClean="0"/>
-              <a:t>6/6/23</a:t>
+              <a:t>6/9/23</a:t>
             </a:fld>
             <a:endParaRPr lang="en-US"/>
           </a:p>
@@ -2406,7 +2407,7 @@
           <a:p>
             <a:fld id="{46B19C4C-2588-E949-9236-D180C138B8F2}" type="datetimeFigureOut">
               <a:rPr lang="en-US" smtClean="0"/>
-              <a:t>6/6/23</a:t>
+              <a:t>6/9/23</a:t>
             </a:fld>
             <a:endParaRPr lang="en-US"/>
           </a:p>
@@ -2695,7 +2696,7 @@
           <a:p>
             <a:fld id="{46B19C4C-2588-E949-9236-D180C138B8F2}" type="datetimeFigureOut">
               <a:rPr lang="en-US" smtClean="0"/>
-              <a:t>6/6/23</a:t>
+              <a:t>6/9/23</a:t>
             </a:fld>
             <a:endParaRPr lang="en-US"/>
           </a:p>
@@ -2938,7 +2939,7 @@
           <a:p>
             <a:fld id="{46B19C4C-2588-E949-9236-D180C138B8F2}" type="datetimeFigureOut">
               <a:rPr lang="en-US" smtClean="0"/>
-              <a:t>6/6/23</a:t>
+              <a:t>6/9/23</a:t>
             </a:fld>
             <a:endParaRPr lang="en-US"/>
           </a:p>
@@ -3489,6 +3490,215 @@
 </p:sld>
 </file>
 
+<file path=ppt/slides/slide10.xml><?xml version="1.0" encoding="utf-8"?>
+<p:sld xmlns:a="http://schemas.openxmlformats.org/drawingml/2006/main" xmlns:r="http://schemas.openxmlformats.org/officeDocument/2006/relationships" xmlns:p="http://schemas.openxmlformats.org/presentationml/2006/main">
+  <p:cSld>
+    <p:spTree>
+      <p:nvGrpSpPr>
+        <p:cNvPr id="1" name=""/>
+        <p:cNvGrpSpPr/>
+        <p:nvPr/>
+      </p:nvGrpSpPr>
+      <p:grpSpPr>
+        <a:xfrm>
+          <a:off x="0" y="0"/>
+          <a:ext cx="0" cy="0"/>
+          <a:chOff x="0" y="0"/>
+          <a:chExt cx="0" cy="0"/>
+        </a:xfrm>
+      </p:grpSpPr>
+      <p:sp>
+        <p:nvSpPr>
+          <p:cNvPr id="2" name="Title 1">
+            <a:extLst>
+              <a:ext uri="{FF2B5EF4-FFF2-40B4-BE49-F238E27FC236}">
+                <a16:creationId xmlns:a16="http://schemas.microsoft.com/office/drawing/2014/main" id="{D1FAE9B1-D2C0-2E6B-2648-90901EF6DB26}"/>
+              </a:ext>
+            </a:extLst>
+          </p:cNvPr>
+          <p:cNvSpPr>
+            <a:spLocks noGrp="1"/>
+          </p:cNvSpPr>
+          <p:nvPr>
+            <p:ph type="title"/>
+          </p:nvPr>
+        </p:nvSpPr>
+        <p:spPr/>
+        <p:txBody>
+          <a:bodyPr/>
+          <a:lstStyle/>
+          <a:p>
+            <a:r>
+              <a:rPr lang="en-US" dirty="0"/>
+              <a:t>forms</a:t>
+            </a:r>
+          </a:p>
+        </p:txBody>
+      </p:sp>
+      <p:sp>
+        <p:nvSpPr>
+          <p:cNvPr id="3" name="Content Placeholder 2">
+            <a:extLst>
+              <a:ext uri="{FF2B5EF4-FFF2-40B4-BE49-F238E27FC236}">
+                <a16:creationId xmlns:a16="http://schemas.microsoft.com/office/drawing/2014/main" id="{587D88C8-4108-304F-2221-559E2859B517}"/>
+              </a:ext>
+            </a:extLst>
+          </p:cNvPr>
+          <p:cNvSpPr>
+            <a:spLocks noGrp="1"/>
+          </p:cNvSpPr>
+          <p:nvPr>
+            <p:ph idx="1"/>
+          </p:nvPr>
+        </p:nvSpPr>
+        <p:spPr>
+          <a:xfrm>
+            <a:off x="183107" y="1402544"/>
+            <a:ext cx="11513023" cy="4351338"/>
+          </a:xfrm>
+        </p:spPr>
+        <p:txBody>
+          <a:bodyPr>
+            <a:normAutofit fontScale="85000" lnSpcReduction="20000"/>
+          </a:bodyPr>
+          <a:lstStyle/>
+          <a:p>
+            <a:r>
+              <a:rPr lang="en-US" dirty="0"/>
+              <a:t>Google forms</a:t>
+            </a:r>
+          </a:p>
+          <a:p>
+            <a:endParaRPr lang="en-US" dirty="0"/>
+          </a:p>
+          <a:p>
+            <a:r>
+              <a:rPr lang="en-US" dirty="0" err="1"/>
+              <a:t>Github</a:t>
+            </a:r>
+            <a:r>
+              <a:rPr lang="en-US" dirty="0"/>
+              <a:t> issue forms</a:t>
+            </a:r>
+          </a:p>
+          <a:p>
+            <a:pPr lvl="1"/>
+            <a:r>
+              <a:rPr lang="en-US" dirty="0"/>
+              <a:t>Get input from the user </a:t>
+            </a:r>
+          </a:p>
+          <a:p>
+            <a:pPr lvl="2"/>
+            <a:r>
+              <a:rPr lang="en-US" dirty="0"/>
+              <a:t>[workflows: Prof Santosh and </a:t>
+            </a:r>
+            <a:r>
+              <a:rPr lang="en-US" dirty="0" err="1"/>
+              <a:t>Jalihal</a:t>
+            </a:r>
+            <a:r>
+              <a:rPr lang="en-US" dirty="0"/>
+              <a:t> and Abhishek]</a:t>
+            </a:r>
+          </a:p>
+          <a:p>
+            <a:pPr lvl="2"/>
+            <a:r>
+              <a:rPr lang="en-US" dirty="0"/>
+              <a:t>Use dummy input for now.</a:t>
+            </a:r>
+          </a:p>
+          <a:p>
+            <a:pPr lvl="1"/>
+            <a:r>
+              <a:rPr lang="en-US" dirty="0"/>
+              <a:t>Perhaps in different languages</a:t>
+            </a:r>
+          </a:p>
+          <a:p>
+            <a:pPr lvl="1"/>
+            <a:r>
+              <a:rPr lang="en-US" dirty="0"/>
+              <a:t>Store the input in the DB (e.g. neo4j).</a:t>
+            </a:r>
+          </a:p>
+          <a:p>
+            <a:endParaRPr lang="en-US" dirty="0"/>
+          </a:p>
+          <a:p>
+            <a:r>
+              <a:rPr lang="en-US" dirty="0"/>
+              <a:t>TBDs for interns:</a:t>
+            </a:r>
+          </a:p>
+          <a:p>
+            <a:pPr lvl="1"/>
+            <a:r>
+              <a:rPr lang="en-US" dirty="0"/>
+              <a:t>Read the </a:t>
+            </a:r>
+            <a:r>
+              <a:rPr lang="en-US" dirty="0" err="1"/>
+              <a:t>github</a:t>
+            </a:r>
+            <a:r>
+              <a:rPr lang="en-US" dirty="0"/>
+              <a:t> issue form documents</a:t>
+            </a:r>
+          </a:p>
+          <a:p>
+            <a:pPr lvl="1"/>
+            <a:r>
+              <a:rPr lang="en-US" dirty="0"/>
+              <a:t>Understand </a:t>
+            </a:r>
+            <a:r>
+              <a:rPr lang="en-US" dirty="0">
+                <a:hlinkClick r:id="rId2"/>
+              </a:rPr>
+              <a:t>https://github.com/vrra/FGAN-Build-a-thon/blob/main/.github/ISSUE_TEMPLATE/submit-usecase-2023.yml</a:t>
+            </a:r>
+            <a:r>
+              <a:rPr lang="en-US" dirty="0"/>
+              <a:t> </a:t>
+            </a:r>
+          </a:p>
+          <a:p>
+            <a:pPr lvl="1"/>
+            <a:r>
+              <a:rPr lang="en-US" dirty="0"/>
+              <a:t>Next session: </a:t>
+            </a:r>
+            <a:r>
+              <a:rPr lang="en-US" dirty="0" err="1"/>
+              <a:t>Github</a:t>
+            </a:r>
+            <a:r>
+              <a:rPr lang="en-US" dirty="0"/>
+              <a:t> actions : how to link this with the backend DB</a:t>
+            </a:r>
+          </a:p>
+          <a:p>
+            <a:pPr lvl="1"/>
+            <a:endParaRPr lang="en-US" dirty="0"/>
+          </a:p>
+        </p:txBody>
+      </p:sp>
+    </p:spTree>
+    <p:extLst>
+      <p:ext uri="{BB962C8B-B14F-4D97-AF65-F5344CB8AC3E}">
+        <p14:creationId xmlns:p14="http://schemas.microsoft.com/office/powerpoint/2010/main" val="480592291"/>
+      </p:ext>
+    </p:extLst>
+  </p:cSld>
+  <p:clrMapOvr>
+    <a:masterClrMapping/>
+  </p:clrMapOvr>
+</p:sld>
+</file>
+
 <file path=ppt/slides/slide2.xml><?xml version="1.0" encoding="utf-8"?>
 <p:sld xmlns:a="http://schemas.openxmlformats.org/drawingml/2006/main" xmlns:r="http://schemas.openxmlformats.org/officeDocument/2006/relationships" xmlns:p="http://schemas.openxmlformats.org/presentationml/2006/main">
   <p:cSld>
@@ -5502,7 +5712,17 @@
             </a:pPr>
             <a:r>
               <a:rPr lang="en-US" dirty="0"/>
-              <a:t>Google </a:t>
+              <a:t>Open the notebook </a:t>
+            </a:r>
+            <a:r>
+              <a:rPr lang="en-US" dirty="0">
+                <a:hlinkClick r:id="rId3"/>
+              </a:rPr>
+              <a:t>https://github.com/vrra/FGAN-Build-a-thon/blob/main/Notebooks2022/build_a_thon_graph_v1.ipynb</a:t>
+            </a:r>
+            <a:r>
+              <a:rPr lang="en-US" dirty="0"/>
+              <a:t> with Google </a:t>
             </a:r>
             <a:r>
               <a:rPr lang="en-US" dirty="0" err="1"/>

</xml_diff>